<commit_message>
Fix Spelling in Presentation
</commit_message>
<xml_diff>
--- a/groups/12-logSync/IASG12ZwischenPraesentation.pptx
+++ b/groups/12-logSync/IASG12ZwischenPraesentation.pptx
@@ -273,7 +273,7 @@
           <a:p>
             <a:fld id="{52DC655F-C517-7942-BD58-66B5EE8007F7}" type="datetimeFigureOut">
               <a:rPr lang="en-CH" smtClean="0"/>
-              <a:t>15.04.20</a:t>
+              <a:t>16.04.20</a:t>
             </a:fld>
             <a:endParaRPr lang="en-CH"/>
           </a:p>
@@ -473,7 +473,7 @@
           <a:p>
             <a:fld id="{52DC655F-C517-7942-BD58-66B5EE8007F7}" type="datetimeFigureOut">
               <a:rPr lang="en-CH" smtClean="0"/>
-              <a:t>15.04.20</a:t>
+              <a:t>16.04.20</a:t>
             </a:fld>
             <a:endParaRPr lang="en-CH"/>
           </a:p>
@@ -683,7 +683,7 @@
           <a:p>
             <a:fld id="{52DC655F-C517-7942-BD58-66B5EE8007F7}" type="datetimeFigureOut">
               <a:rPr lang="en-CH" smtClean="0"/>
-              <a:t>15.04.20</a:t>
+              <a:t>16.04.20</a:t>
             </a:fld>
             <a:endParaRPr lang="en-CH"/>
           </a:p>
@@ -883,7 +883,7 @@
           <a:p>
             <a:fld id="{52DC655F-C517-7942-BD58-66B5EE8007F7}" type="datetimeFigureOut">
               <a:rPr lang="en-CH" smtClean="0"/>
-              <a:t>15.04.20</a:t>
+              <a:t>16.04.20</a:t>
             </a:fld>
             <a:endParaRPr lang="en-CH"/>
           </a:p>
@@ -1159,7 +1159,7 @@
           <a:p>
             <a:fld id="{52DC655F-C517-7942-BD58-66B5EE8007F7}" type="datetimeFigureOut">
               <a:rPr lang="en-CH" smtClean="0"/>
-              <a:t>15.04.20</a:t>
+              <a:t>16.04.20</a:t>
             </a:fld>
             <a:endParaRPr lang="en-CH"/>
           </a:p>
@@ -1427,7 +1427,7 @@
           <a:p>
             <a:fld id="{52DC655F-C517-7942-BD58-66B5EE8007F7}" type="datetimeFigureOut">
               <a:rPr lang="en-CH" smtClean="0"/>
-              <a:t>15.04.20</a:t>
+              <a:t>16.04.20</a:t>
             </a:fld>
             <a:endParaRPr lang="en-CH"/>
           </a:p>
@@ -1842,7 +1842,7 @@
           <a:p>
             <a:fld id="{52DC655F-C517-7942-BD58-66B5EE8007F7}" type="datetimeFigureOut">
               <a:rPr lang="en-CH" smtClean="0"/>
-              <a:t>15.04.20</a:t>
+              <a:t>16.04.20</a:t>
             </a:fld>
             <a:endParaRPr lang="en-CH"/>
           </a:p>
@@ -1984,7 +1984,7 @@
           <a:p>
             <a:fld id="{52DC655F-C517-7942-BD58-66B5EE8007F7}" type="datetimeFigureOut">
               <a:rPr lang="en-CH" smtClean="0"/>
-              <a:t>15.04.20</a:t>
+              <a:t>16.04.20</a:t>
             </a:fld>
             <a:endParaRPr lang="en-CH"/>
           </a:p>
@@ -2097,7 +2097,7 @@
           <a:p>
             <a:fld id="{52DC655F-C517-7942-BD58-66B5EE8007F7}" type="datetimeFigureOut">
               <a:rPr lang="en-CH" smtClean="0"/>
-              <a:t>15.04.20</a:t>
+              <a:t>16.04.20</a:t>
             </a:fld>
             <a:endParaRPr lang="en-CH"/>
           </a:p>
@@ -2410,7 +2410,7 @@
           <a:p>
             <a:fld id="{52DC655F-C517-7942-BD58-66B5EE8007F7}" type="datetimeFigureOut">
               <a:rPr lang="en-CH" smtClean="0"/>
-              <a:t>15.04.20</a:t>
+              <a:t>16.04.20</a:t>
             </a:fld>
             <a:endParaRPr lang="en-CH"/>
           </a:p>
@@ -2699,7 +2699,7 @@
           <a:p>
             <a:fld id="{52DC655F-C517-7942-BD58-66B5EE8007F7}" type="datetimeFigureOut">
               <a:rPr lang="en-CH" smtClean="0"/>
-              <a:t>15.04.20</a:t>
+              <a:t>16.04.20</a:t>
             </a:fld>
             <a:endParaRPr lang="en-CH"/>
           </a:p>
@@ -2942,7 +2942,7 @@
           <a:p>
             <a:fld id="{52DC655F-C517-7942-BD58-66B5EE8007F7}" type="datetimeFigureOut">
               <a:rPr lang="en-CH" smtClean="0"/>
-              <a:t>15.04.20</a:t>
+              <a:t>16.04.20</a:t>
             </a:fld>
             <a:endParaRPr lang="en-CH"/>
           </a:p>
@@ -3701,7 +3701,7 @@
           <a:p>
             <a:r>
               <a:rPr lang="en-CH" dirty="0"/>
-              <a:t>Datagramm</a:t>
+              <a:t>Organigramm</a:t>
             </a:r>
           </a:p>
         </p:txBody>
@@ -4332,240 +4332,6 @@
           </a:p>
         </p:txBody>
       </p:sp>
-      <p:cxnSp>
-        <p:nvCxnSpPr>
-          <p:cNvPr id="23" name="Straight Arrow Connector 22">
-            <a:extLst>
-              <a:ext uri="{FF2B5EF4-FFF2-40B4-BE49-F238E27FC236}">
-                <a16:creationId xmlns:a16="http://schemas.microsoft.com/office/drawing/2014/main" id="{C7C188AF-64B4-534F-B85E-46713D4917C4}"/>
-              </a:ext>
-            </a:extLst>
-          </p:cNvPr>
-          <p:cNvCxnSpPr/>
-          <p:nvPr/>
-        </p:nvCxnSpPr>
-        <p:spPr>
-          <a:xfrm>
-            <a:off x="2745254" y="3285519"/>
-            <a:ext cx="543736" cy="0"/>
-          </a:xfrm>
-          <a:prstGeom prst="straightConnector1">
-            <a:avLst/>
-          </a:prstGeom>
-          <a:ln>
-            <a:tailEnd type="triangle"/>
-          </a:ln>
-        </p:spPr>
-        <p:style>
-          <a:lnRef idx="3">
-            <a:schemeClr val="accent1"/>
-          </a:lnRef>
-          <a:fillRef idx="0">
-            <a:schemeClr val="accent1"/>
-          </a:fillRef>
-          <a:effectRef idx="2">
-            <a:schemeClr val="accent1"/>
-          </a:effectRef>
-          <a:fontRef idx="minor">
-            <a:schemeClr val="tx1"/>
-          </a:fontRef>
-        </p:style>
-      </p:cxnSp>
-      <p:cxnSp>
-        <p:nvCxnSpPr>
-          <p:cNvPr id="24" name="Straight Arrow Connector 23">
-            <a:extLst>
-              <a:ext uri="{FF2B5EF4-FFF2-40B4-BE49-F238E27FC236}">
-                <a16:creationId xmlns:a16="http://schemas.microsoft.com/office/drawing/2014/main" id="{928CBCCE-4532-6E43-A52B-6489D222953A}"/>
-              </a:ext>
-            </a:extLst>
-          </p:cNvPr>
-          <p:cNvCxnSpPr/>
-          <p:nvPr/>
-        </p:nvCxnSpPr>
-        <p:spPr>
-          <a:xfrm>
-            <a:off x="4645492" y="3271231"/>
-            <a:ext cx="543736" cy="0"/>
-          </a:xfrm>
-          <a:prstGeom prst="straightConnector1">
-            <a:avLst/>
-          </a:prstGeom>
-          <a:ln>
-            <a:tailEnd type="triangle"/>
-          </a:ln>
-        </p:spPr>
-        <p:style>
-          <a:lnRef idx="3">
-            <a:schemeClr val="accent1"/>
-          </a:lnRef>
-          <a:fillRef idx="0">
-            <a:schemeClr val="accent1"/>
-          </a:fillRef>
-          <a:effectRef idx="2">
-            <a:schemeClr val="accent1"/>
-          </a:effectRef>
-          <a:fontRef idx="minor">
-            <a:schemeClr val="tx1"/>
-          </a:fontRef>
-        </p:style>
-      </p:cxnSp>
-      <p:cxnSp>
-        <p:nvCxnSpPr>
-          <p:cNvPr id="25" name="Straight Arrow Connector 24">
-            <a:extLst>
-              <a:ext uri="{FF2B5EF4-FFF2-40B4-BE49-F238E27FC236}">
-                <a16:creationId xmlns:a16="http://schemas.microsoft.com/office/drawing/2014/main" id="{6A32C62E-F7EA-8041-BD20-9B0A8FB16092}"/>
-              </a:ext>
-            </a:extLst>
-          </p:cNvPr>
-          <p:cNvCxnSpPr/>
-          <p:nvPr/>
-        </p:nvCxnSpPr>
-        <p:spPr>
-          <a:xfrm>
-            <a:off x="7845892" y="1628168"/>
-            <a:ext cx="543736" cy="0"/>
-          </a:xfrm>
-          <a:prstGeom prst="straightConnector1">
-            <a:avLst/>
-          </a:prstGeom>
-          <a:ln>
-            <a:tailEnd type="triangle"/>
-          </a:ln>
-        </p:spPr>
-        <p:style>
-          <a:lnRef idx="3">
-            <a:schemeClr val="accent1"/>
-          </a:lnRef>
-          <a:fillRef idx="0">
-            <a:schemeClr val="accent1"/>
-          </a:fillRef>
-          <a:effectRef idx="2">
-            <a:schemeClr val="accent1"/>
-          </a:effectRef>
-          <a:fontRef idx="minor">
-            <a:schemeClr val="tx1"/>
-          </a:fontRef>
-        </p:style>
-      </p:cxnSp>
-      <p:cxnSp>
-        <p:nvCxnSpPr>
-          <p:cNvPr id="26" name="Straight Arrow Connector 25">
-            <a:extLst>
-              <a:ext uri="{FF2B5EF4-FFF2-40B4-BE49-F238E27FC236}">
-                <a16:creationId xmlns:a16="http://schemas.microsoft.com/office/drawing/2014/main" id="{ABDC2FEE-B2D5-2F47-A872-679A4F07D057}"/>
-              </a:ext>
-            </a:extLst>
-          </p:cNvPr>
-          <p:cNvCxnSpPr/>
-          <p:nvPr/>
-        </p:nvCxnSpPr>
-        <p:spPr>
-          <a:xfrm>
-            <a:off x="7845892" y="2799743"/>
-            <a:ext cx="543736" cy="0"/>
-          </a:xfrm>
-          <a:prstGeom prst="straightConnector1">
-            <a:avLst/>
-          </a:prstGeom>
-          <a:ln>
-            <a:tailEnd type="triangle"/>
-          </a:ln>
-        </p:spPr>
-        <p:style>
-          <a:lnRef idx="3">
-            <a:schemeClr val="accent1"/>
-          </a:lnRef>
-          <a:fillRef idx="0">
-            <a:schemeClr val="accent1"/>
-          </a:fillRef>
-          <a:effectRef idx="2">
-            <a:schemeClr val="accent1"/>
-          </a:effectRef>
-          <a:fontRef idx="minor">
-            <a:schemeClr val="tx1"/>
-          </a:fontRef>
-        </p:style>
-      </p:cxnSp>
-      <p:cxnSp>
-        <p:nvCxnSpPr>
-          <p:cNvPr id="27" name="Straight Arrow Connector 26">
-            <a:extLst>
-              <a:ext uri="{FF2B5EF4-FFF2-40B4-BE49-F238E27FC236}">
-                <a16:creationId xmlns:a16="http://schemas.microsoft.com/office/drawing/2014/main" id="{0E322117-9D7B-624E-8187-252AD0727EB1}"/>
-              </a:ext>
-            </a:extLst>
-          </p:cNvPr>
-          <p:cNvCxnSpPr/>
-          <p:nvPr/>
-        </p:nvCxnSpPr>
-        <p:spPr>
-          <a:xfrm>
-            <a:off x="7803029" y="3914168"/>
-            <a:ext cx="543736" cy="0"/>
-          </a:xfrm>
-          <a:prstGeom prst="straightConnector1">
-            <a:avLst/>
-          </a:prstGeom>
-          <a:ln>
-            <a:tailEnd type="triangle"/>
-          </a:ln>
-        </p:spPr>
-        <p:style>
-          <a:lnRef idx="3">
-            <a:schemeClr val="accent1"/>
-          </a:lnRef>
-          <a:fillRef idx="0">
-            <a:schemeClr val="accent1"/>
-          </a:fillRef>
-          <a:effectRef idx="2">
-            <a:schemeClr val="accent1"/>
-          </a:effectRef>
-          <a:fontRef idx="minor">
-            <a:schemeClr val="tx1"/>
-          </a:fontRef>
-        </p:style>
-      </p:cxnSp>
-      <p:cxnSp>
-        <p:nvCxnSpPr>
-          <p:cNvPr id="28" name="Straight Arrow Connector 27">
-            <a:extLst>
-              <a:ext uri="{FF2B5EF4-FFF2-40B4-BE49-F238E27FC236}">
-                <a16:creationId xmlns:a16="http://schemas.microsoft.com/office/drawing/2014/main" id="{955588B5-7BB5-DE4E-983D-FC06F869A7D0}"/>
-              </a:ext>
-            </a:extLst>
-          </p:cNvPr>
-          <p:cNvCxnSpPr/>
-          <p:nvPr/>
-        </p:nvCxnSpPr>
-        <p:spPr>
-          <a:xfrm>
-            <a:off x="7788742" y="5042881"/>
-            <a:ext cx="543736" cy="0"/>
-          </a:xfrm>
-          <a:prstGeom prst="straightConnector1">
-            <a:avLst/>
-          </a:prstGeom>
-          <a:ln>
-            <a:tailEnd type="triangle"/>
-          </a:ln>
-        </p:spPr>
-        <p:style>
-          <a:lnRef idx="3">
-            <a:schemeClr val="accent1"/>
-          </a:lnRef>
-          <a:fillRef idx="0">
-            <a:schemeClr val="accent1"/>
-          </a:fillRef>
-          <a:effectRef idx="2">
-            <a:schemeClr val="accent1"/>
-          </a:effectRef>
-          <a:fontRef idx="minor">
-            <a:schemeClr val="tx1"/>
-          </a:fontRef>
-        </p:style>
-      </p:cxnSp>
       <p:sp>
         <p:nvSpPr>
           <p:cNvPr id="29" name="TextBox 28">
@@ -4671,6 +4437,258 @@
           </a:p>
         </p:txBody>
       </p:sp>
+      <p:cxnSp>
+        <p:nvCxnSpPr>
+          <p:cNvPr id="8" name="Straight Arrow Connector 7">
+            <a:extLst>
+              <a:ext uri="{FF2B5EF4-FFF2-40B4-BE49-F238E27FC236}">
+                <a16:creationId xmlns:a16="http://schemas.microsoft.com/office/drawing/2014/main" id="{39C0A2CE-7A7E-F541-8D0D-BEBB98D358CA}"/>
+              </a:ext>
+            </a:extLst>
+          </p:cNvPr>
+          <p:cNvCxnSpPr>
+            <a:cxnSpLocks/>
+          </p:cNvCxnSpPr>
+          <p:nvPr/>
+        </p:nvCxnSpPr>
+        <p:spPr>
+          <a:xfrm>
+            <a:off x="2625735" y="3302931"/>
+            <a:ext cx="725214" cy="0"/>
+          </a:xfrm>
+          <a:prstGeom prst="straightConnector1">
+            <a:avLst/>
+          </a:prstGeom>
+          <a:ln>
+            <a:headEnd type="triangle"/>
+            <a:tailEnd type="triangle"/>
+          </a:ln>
+        </p:spPr>
+        <p:style>
+          <a:lnRef idx="3">
+            <a:schemeClr val="accent5"/>
+          </a:lnRef>
+          <a:fillRef idx="0">
+            <a:schemeClr val="accent5"/>
+          </a:fillRef>
+          <a:effectRef idx="2">
+            <a:schemeClr val="accent5"/>
+          </a:effectRef>
+          <a:fontRef idx="minor">
+            <a:schemeClr val="tx1"/>
+          </a:fontRef>
+        </p:style>
+      </p:cxnSp>
+      <p:cxnSp>
+        <p:nvCxnSpPr>
+          <p:cNvPr id="32" name="Straight Arrow Connector 31">
+            <a:extLst>
+              <a:ext uri="{FF2B5EF4-FFF2-40B4-BE49-F238E27FC236}">
+                <a16:creationId xmlns:a16="http://schemas.microsoft.com/office/drawing/2014/main" id="{6DC6B6E6-EB34-9241-926B-A85019319FE6}"/>
+              </a:ext>
+            </a:extLst>
+          </p:cNvPr>
+          <p:cNvCxnSpPr>
+            <a:cxnSpLocks/>
+          </p:cNvCxnSpPr>
+          <p:nvPr/>
+        </p:nvCxnSpPr>
+        <p:spPr>
+          <a:xfrm>
+            <a:off x="4507087" y="3292421"/>
+            <a:ext cx="725214" cy="0"/>
+          </a:xfrm>
+          <a:prstGeom prst="straightConnector1">
+            <a:avLst/>
+          </a:prstGeom>
+          <a:ln>
+            <a:headEnd type="triangle"/>
+            <a:tailEnd type="triangle"/>
+          </a:ln>
+        </p:spPr>
+        <p:style>
+          <a:lnRef idx="3">
+            <a:schemeClr val="accent5"/>
+          </a:lnRef>
+          <a:fillRef idx="0">
+            <a:schemeClr val="accent5"/>
+          </a:fillRef>
+          <a:effectRef idx="2">
+            <a:schemeClr val="accent5"/>
+          </a:effectRef>
+          <a:fontRef idx="minor">
+            <a:schemeClr val="tx1"/>
+          </a:fontRef>
+        </p:style>
+      </p:cxnSp>
+      <p:cxnSp>
+        <p:nvCxnSpPr>
+          <p:cNvPr id="33" name="Straight Arrow Connector 32">
+            <a:extLst>
+              <a:ext uri="{FF2B5EF4-FFF2-40B4-BE49-F238E27FC236}">
+                <a16:creationId xmlns:a16="http://schemas.microsoft.com/office/drawing/2014/main" id="{65B21AFB-4854-9F4D-8EF1-D25DFB2F2B74}"/>
+              </a:ext>
+            </a:extLst>
+          </p:cNvPr>
+          <p:cNvCxnSpPr>
+            <a:cxnSpLocks/>
+          </p:cNvCxnSpPr>
+          <p:nvPr/>
+        </p:nvCxnSpPr>
+        <p:spPr>
+          <a:xfrm>
+            <a:off x="7691721" y="1558214"/>
+            <a:ext cx="725214" cy="0"/>
+          </a:xfrm>
+          <a:prstGeom prst="straightConnector1">
+            <a:avLst/>
+          </a:prstGeom>
+          <a:ln>
+            <a:headEnd type="triangle"/>
+            <a:tailEnd type="triangle"/>
+          </a:ln>
+        </p:spPr>
+        <p:style>
+          <a:lnRef idx="3">
+            <a:schemeClr val="accent5"/>
+          </a:lnRef>
+          <a:fillRef idx="0">
+            <a:schemeClr val="accent5"/>
+          </a:fillRef>
+          <a:effectRef idx="2">
+            <a:schemeClr val="accent5"/>
+          </a:effectRef>
+          <a:fontRef idx="minor">
+            <a:schemeClr val="tx1"/>
+          </a:fontRef>
+        </p:style>
+      </p:cxnSp>
+      <p:cxnSp>
+        <p:nvCxnSpPr>
+          <p:cNvPr id="34" name="Straight Arrow Connector 33">
+            <a:extLst>
+              <a:ext uri="{FF2B5EF4-FFF2-40B4-BE49-F238E27FC236}">
+                <a16:creationId xmlns:a16="http://schemas.microsoft.com/office/drawing/2014/main" id="{2D664545-D839-8C44-BF84-3C3B81B89E4D}"/>
+              </a:ext>
+            </a:extLst>
+          </p:cNvPr>
+          <p:cNvCxnSpPr>
+            <a:cxnSpLocks/>
+          </p:cNvCxnSpPr>
+          <p:nvPr/>
+        </p:nvCxnSpPr>
+        <p:spPr>
+          <a:xfrm>
+            <a:off x="7733763" y="2777414"/>
+            <a:ext cx="725214" cy="0"/>
+          </a:xfrm>
+          <a:prstGeom prst="straightConnector1">
+            <a:avLst/>
+          </a:prstGeom>
+          <a:ln>
+            <a:headEnd type="triangle"/>
+            <a:tailEnd type="triangle"/>
+          </a:ln>
+        </p:spPr>
+        <p:style>
+          <a:lnRef idx="3">
+            <a:schemeClr val="accent5"/>
+          </a:lnRef>
+          <a:fillRef idx="0">
+            <a:schemeClr val="accent5"/>
+          </a:fillRef>
+          <a:effectRef idx="2">
+            <a:schemeClr val="accent5"/>
+          </a:effectRef>
+          <a:fontRef idx="minor">
+            <a:schemeClr val="tx1"/>
+          </a:fontRef>
+        </p:style>
+      </p:cxnSp>
+      <p:cxnSp>
+        <p:nvCxnSpPr>
+          <p:cNvPr id="35" name="Straight Arrow Connector 34">
+            <a:extLst>
+              <a:ext uri="{FF2B5EF4-FFF2-40B4-BE49-F238E27FC236}">
+                <a16:creationId xmlns:a16="http://schemas.microsoft.com/office/drawing/2014/main" id="{A3E573DE-DDBF-D64B-A663-A6388465258D}"/>
+              </a:ext>
+            </a:extLst>
+          </p:cNvPr>
+          <p:cNvCxnSpPr>
+            <a:cxnSpLocks/>
+          </p:cNvCxnSpPr>
+          <p:nvPr/>
+        </p:nvCxnSpPr>
+        <p:spPr>
+          <a:xfrm>
+            <a:off x="7702232" y="3912531"/>
+            <a:ext cx="725214" cy="0"/>
+          </a:xfrm>
+          <a:prstGeom prst="straightConnector1">
+            <a:avLst/>
+          </a:prstGeom>
+          <a:ln>
+            <a:headEnd type="triangle"/>
+            <a:tailEnd type="triangle"/>
+          </a:ln>
+        </p:spPr>
+        <p:style>
+          <a:lnRef idx="3">
+            <a:schemeClr val="accent5"/>
+          </a:lnRef>
+          <a:fillRef idx="0">
+            <a:schemeClr val="accent5"/>
+          </a:fillRef>
+          <a:effectRef idx="2">
+            <a:schemeClr val="accent5"/>
+          </a:effectRef>
+          <a:fontRef idx="minor">
+            <a:schemeClr val="tx1"/>
+          </a:fontRef>
+        </p:style>
+      </p:cxnSp>
+      <p:cxnSp>
+        <p:nvCxnSpPr>
+          <p:cNvPr id="36" name="Straight Arrow Connector 35">
+            <a:extLst>
+              <a:ext uri="{FF2B5EF4-FFF2-40B4-BE49-F238E27FC236}">
+                <a16:creationId xmlns:a16="http://schemas.microsoft.com/office/drawing/2014/main" id="{A2A4D352-C00A-7547-926E-AB979FBB3ABF}"/>
+              </a:ext>
+            </a:extLst>
+          </p:cNvPr>
+          <p:cNvCxnSpPr>
+            <a:cxnSpLocks/>
+          </p:cNvCxnSpPr>
+          <p:nvPr/>
+        </p:nvCxnSpPr>
+        <p:spPr>
+          <a:xfrm>
+            <a:off x="7691721" y="5037137"/>
+            <a:ext cx="725214" cy="0"/>
+          </a:xfrm>
+          <a:prstGeom prst="straightConnector1">
+            <a:avLst/>
+          </a:prstGeom>
+          <a:ln>
+            <a:headEnd type="triangle"/>
+            <a:tailEnd type="triangle"/>
+          </a:ln>
+        </p:spPr>
+        <p:style>
+          <a:lnRef idx="3">
+            <a:schemeClr val="accent5"/>
+          </a:lnRef>
+          <a:fillRef idx="0">
+            <a:schemeClr val="accent5"/>
+          </a:fillRef>
+          <a:effectRef idx="2">
+            <a:schemeClr val="accent5"/>
+          </a:effectRef>
+          <a:fontRef idx="minor">
+            <a:schemeClr val="tx1"/>
+          </a:fontRef>
+        </p:style>
+      </p:cxnSp>
     </p:spTree>
     <p:extLst>
       <p:ext uri="{BB962C8B-B14F-4D97-AF65-F5344CB8AC3E}">

</xml_diff>